<commit_message>
Restructured first two parts.
</commit_message>
<xml_diff>
--- a/draft.pptx
+++ b/draft.pptx
@@ -12,9 +12,9 @@
     <p:sldId id="258" r:id="rId6"/>
     <p:sldId id="259" r:id="rId7"/>
     <p:sldId id="260" r:id="rId8"/>
-    <p:sldId id="261" r:id="rId9"/>
+    <p:sldId id="262" r:id="rId9"/>
     <p:sldId id="275" r:id="rId10"/>
-    <p:sldId id="262" r:id="rId11"/>
+    <p:sldId id="277" r:id="rId11"/>
     <p:sldId id="263" r:id="rId12"/>
     <p:sldId id="264" r:id="rId13"/>
     <p:sldId id="265" r:id="rId14"/>
@@ -315,7 +315,7 @@
           <a:p>
             <a:fld id="{C8A432C8-69A7-458B-9684-2BFA64B31948}" type="datetime2">
               <a:rPr lang="en-US" smtClean="0"/>
-              <a:t>Wednesday, July 5, 17</a:t>
+              <a:t>Monday, July 10, 17</a:t>
             </a:fld>
             <a:endParaRPr lang="en-US"/>
           </a:p>
@@ -517,7 +517,7 @@
           <a:p>
             <a:fld id="{8CC057FC-95B6-4D89-AFDA-ABA33EE921E5}" type="datetime2">
               <a:rPr lang="en-US" smtClean="0"/>
-              <a:t>Wednesday, July 5, 17</a:t>
+              <a:t>Monday, July 10, 17</a:t>
             </a:fld>
             <a:endParaRPr lang="en-US"/>
           </a:p>
@@ -694,7 +694,7 @@
           <a:p>
             <a:fld id="{EC4549AC-EB31-477F-92A9-B1988E232878}" type="datetime2">
               <a:rPr lang="en-US" smtClean="0"/>
-              <a:t>Wednesday, July 5, 17</a:t>
+              <a:t>Monday, July 10, 17</a:t>
             </a:fld>
             <a:endParaRPr lang="en-US"/>
           </a:p>
@@ -861,7 +861,7 @@
           <a:p>
             <a:fld id="{6396A3A3-94A6-4E5B-AF39-173ACA3E61CC}" type="datetime2">
               <a:rPr lang="en-US" smtClean="0"/>
-              <a:t>Wednesday, July 5, 17</a:t>
+              <a:t>Monday, July 10, 17</a:t>
             </a:fld>
             <a:endParaRPr lang="en-US"/>
           </a:p>
@@ -1111,7 +1111,7 @@
           <a:p>
             <a:fld id="{9933D019-A32C-4EAD-B8E6-DBDA699692FD}" type="datetime2">
               <a:rPr lang="en-US" smtClean="0"/>
-              <a:t>Wednesday, July 5, 17</a:t>
+              <a:t>Monday, July 10, 17</a:t>
             </a:fld>
             <a:endParaRPr lang="en-US"/>
           </a:p>
@@ -1431,7 +1431,7 @@
           <a:p>
             <a:fld id="{CCEBA98F-560C-4997-81C4-81D4D9187EAB}" type="datetime2">
               <a:rPr lang="en-US" smtClean="0"/>
-              <a:t>Wednesday, July 5, 17</a:t>
+              <a:t>Monday, July 10, 17</a:t>
             </a:fld>
             <a:endParaRPr lang="en-US"/>
           </a:p>
@@ -1899,7 +1899,7 @@
           <a:p>
             <a:fld id="{150972B2-CA5C-437D-87D0-8081271A9E4B}" type="datetime2">
               <a:rPr lang="en-US" smtClean="0"/>
-              <a:t>Wednesday, July 5, 17</a:t>
+              <a:t>Monday, July 10, 17</a:t>
             </a:fld>
             <a:endParaRPr lang="en-US"/>
           </a:p>
@@ -2049,7 +2049,7 @@
           <a:p>
             <a:fld id="{79CD4847-11EF-4466-A8AD-85CDB7B49118}" type="datetime2">
               <a:rPr lang="en-US" smtClean="0"/>
-              <a:t>Wednesday, July 5, 17</a:t>
+              <a:t>Monday, July 10, 17</a:t>
             </a:fld>
             <a:endParaRPr lang="en-US"/>
           </a:p>
@@ -2141,7 +2141,7 @@
           <a:p>
             <a:fld id="{F168457A-3AB9-4880-8A0C-9F8524491207}" type="datetime2">
               <a:rPr lang="en-US" smtClean="0"/>
-              <a:t>Wednesday, July 5, 17</a:t>
+              <a:t>Monday, July 10, 17</a:t>
             </a:fld>
             <a:endParaRPr lang="en-US"/>
           </a:p>
@@ -2417,7 +2417,7 @@
           <a:p>
             <a:fld id="{3FE976D3-5B7F-4300-ABED-C91F1B2AE209}" type="datetime2">
               <a:rPr lang="en-US" smtClean="0"/>
-              <a:t>Wednesday, July 5, 17</a:t>
+              <a:t>Monday, July 10, 17</a:t>
             </a:fld>
             <a:endParaRPr lang="en-US"/>
           </a:p>
@@ -2724,7 +2724,7 @@
           <a:p>
             <a:fld id="{EBDC1E59-17DD-41CE-97CA-624A472382D4}" type="datetime2">
               <a:rPr lang="en-US" smtClean="0"/>
-              <a:t>Wednesday, July 5, 17</a:t>
+              <a:t>Monday, July 10, 17</a:t>
             </a:fld>
             <a:endParaRPr lang="en-US"/>
           </a:p>
@@ -3024,7 +3024,7 @@
           <a:p>
             <a:fld id="{A80CB818-7379-467D-8E76-EF9D9074A26C}" type="datetime2">
               <a:rPr lang="en-US" smtClean="0"/>
-              <a:t>Wednesday, July 5, 17</a:t>
+              <a:t>Monday, July 10, 17</a:t>
             </a:fld>
             <a:endParaRPr lang="en-US" dirty="0"/>
           </a:p>
@@ -3521,7 +3521,7 @@
           <a:p>
             <a:r>
               <a:rPr lang="en-US" dirty="0" smtClean="0"/>
-              <a:t>Our own experimental approach</a:t>
+              <a:t>Experiments</a:t>
             </a:r>
             <a:endParaRPr lang="en-US" dirty="0"/>
           </a:p>
@@ -3544,24 +3544,13 @@
           <a:p>
             <a:r>
               <a:rPr lang="en-US" dirty="0" smtClean="0"/>
-              <a:t>Experiment </a:t>
-            </a:r>
-            <a:r>
-              <a:rPr lang="en-US" dirty="0" err="1" smtClean="0"/>
-              <a:t>desing</a:t>
-            </a:r>
-            <a:endParaRPr lang="en-US" dirty="0" smtClean="0"/>
-          </a:p>
-          <a:p>
-            <a:r>
-              <a:rPr lang="en-US" dirty="0" smtClean="0"/>
-              <a:t>Network extraction</a:t>
-            </a:r>
-          </a:p>
-          <a:p>
-            <a:r>
-              <a:rPr lang="en-US" dirty="0" smtClean="0"/>
-              <a:t>Network analysis</a:t>
+              <a:t>Show setup</a:t>
+            </a:r>
+          </a:p>
+          <a:p>
+            <a:r>
+              <a:rPr lang="en-US" dirty="0" smtClean="0"/>
+              <a:t>Show video</a:t>
             </a:r>
             <a:endParaRPr lang="en-US" dirty="0"/>
           </a:p>
@@ -3570,7 +3559,7 @@
     </p:spTree>
     <p:extLst>
       <p:ext uri="{BB962C8B-B14F-4D97-AF65-F5344CB8AC3E}">
-        <p14:creationId xmlns:p14="http://schemas.microsoft.com/office/powerpoint/2010/main" val="2030110140"/>
+        <p14:creationId xmlns:p14="http://schemas.microsoft.com/office/powerpoint/2010/main" val="3595454569"/>
       </p:ext>
     </p:extLst>
   </p:cSld>
@@ -3614,7 +3603,11 @@
           <a:p>
             <a:r>
               <a:rPr lang="en-US" dirty="0" smtClean="0"/>
-              <a:t>Network Extraction</a:t>
+              <a:t>Network </a:t>
+            </a:r>
+            <a:r>
+              <a:rPr lang="en-US" dirty="0" smtClean="0"/>
+              <a:t>Extraction From Images</a:t>
             </a:r>
             <a:endParaRPr lang="en-US" dirty="0"/>
           </a:p>
@@ -3648,6 +3641,36 @@
           </a:p>
         </p:txBody>
       </p:sp>
+      <p:pic>
+        <p:nvPicPr>
+          <p:cNvPr id="5" name="Picture 4" descr="workflow.png"/>
+          <p:cNvPicPr>
+            <a:picLocks noChangeAspect="1"/>
+          </p:cNvPicPr>
+          <p:nvPr/>
+        </p:nvPicPr>
+        <p:blipFill>
+          <a:blip r:embed="rId2">
+            <a:extLst>
+              <a:ext uri="{28A0092B-C50C-407E-A947-70E740481C1C}">
+                <a14:useLocalDpi xmlns:a14="http://schemas.microsoft.com/office/drawing/2010/main" val="0"/>
+              </a:ext>
+            </a:extLst>
+          </a:blip>
+          <a:stretch>
+            <a:fillRect/>
+          </a:stretch>
+        </p:blipFill>
+        <p:spPr>
+          <a:xfrm>
+            <a:off x="3859118" y="1935480"/>
+            <a:ext cx="4257040" cy="3281680"/>
+          </a:xfrm>
+          <a:prstGeom prst="rect">
+            <a:avLst/>
+          </a:prstGeom>
+        </p:spPr>
+      </p:pic>
     </p:spTree>
     <p:extLst>
       <p:ext uri="{BB962C8B-B14F-4D97-AF65-F5344CB8AC3E}">
@@ -3718,23 +3741,59 @@
           <a:p>
             <a:r>
               <a:rPr lang="en-US" dirty="0" smtClean="0"/>
-              <a:t>Various observables forming a catalogue</a:t>
-            </a:r>
-          </a:p>
-          <a:p>
-            <a:r>
-              <a:rPr lang="en-US" dirty="0" smtClean="0"/>
-              <a:t>Knowledgebase </a:t>
-            </a:r>
-          </a:p>
-          <a:p>
-            <a:r>
-              <a:rPr lang="en-US" dirty="0" smtClean="0"/>
-              <a:t>Example information</a:t>
-            </a:r>
-          </a:p>
-        </p:txBody>
-      </p:sp>
+              <a:t>Various observables forming a </a:t>
+            </a:r>
+            <a:r>
+              <a:rPr lang="en-US" dirty="0" smtClean="0"/>
+              <a:t>catalogue</a:t>
+            </a:r>
+          </a:p>
+          <a:p>
+            <a:r>
+              <a:rPr lang="en-US" dirty="0" smtClean="0"/>
+              <a:t>Path, face, cut and percolation</a:t>
+            </a:r>
+            <a:endParaRPr lang="en-US" dirty="0" smtClean="0"/>
+          </a:p>
+          <a:p>
+            <a:r>
+              <a:rPr lang="en-US" dirty="0" smtClean="0"/>
+              <a:t>Example information robustness</a:t>
+            </a:r>
+            <a:endParaRPr lang="en-US" dirty="0" smtClean="0"/>
+          </a:p>
+        </p:txBody>
+      </p:sp>
+      <p:pic>
+        <p:nvPicPr>
+          <p:cNvPr id="4" name="Picture 3" descr="tracking.pdf"/>
+          <p:cNvPicPr>
+            <a:picLocks noChangeAspect="1"/>
+          </p:cNvPicPr>
+          <p:nvPr/>
+        </p:nvPicPr>
+        <p:blipFill>
+          <a:blip r:embed="rId2">
+            <a:extLst>
+              <a:ext uri="{28A0092B-C50C-407E-A947-70E740481C1C}">
+                <a14:useLocalDpi xmlns:a14="http://schemas.microsoft.com/office/drawing/2010/main" val="0"/>
+              </a:ext>
+            </a:extLst>
+          </a:blip>
+          <a:stretch>
+            <a:fillRect/>
+          </a:stretch>
+        </p:blipFill>
+        <p:spPr>
+          <a:xfrm>
+            <a:off x="3047979" y="2755361"/>
+            <a:ext cx="4013200" cy="2908300"/>
+          </a:xfrm>
+          <a:prstGeom prst="rect">
+            <a:avLst/>
+          </a:prstGeom>
+        </p:spPr>
+      </p:pic>
     </p:spTree>
     <p:extLst>
       <p:ext uri="{BB962C8B-B14F-4D97-AF65-F5344CB8AC3E}">
@@ -3805,7 +3864,13 @@
           <a:p>
             <a:r>
               <a:rPr lang="en-US" dirty="0" smtClean="0"/>
-              <a:t>SMGR</a:t>
+              <a:t>SMGR repository concept</a:t>
+            </a:r>
+          </a:p>
+          <a:p>
+            <a:r>
+              <a:rPr lang="en-US" dirty="0" smtClean="0"/>
+              <a:t>benefits</a:t>
             </a:r>
             <a:endParaRPr lang="en-US" dirty="0"/>
           </a:p>
@@ -3982,8 +4047,8 @@
               <a:t> for a distributed </a:t>
             </a:r>
             <a:r>
-              <a:rPr lang="en-US" dirty="0" err="1" smtClean="0"/>
-              <a:t>algorihtm</a:t>
+              <a:rPr lang="en-US" dirty="0" smtClean="0"/>
+              <a:t>algorithm</a:t>
             </a:r>
             <a:endParaRPr lang="en-US" dirty="0" smtClean="0"/>
           </a:p>
@@ -4793,7 +4858,11 @@
           <a:bodyPr/>
           <a:lstStyle/>
           <a:p>
-            <a:endParaRPr lang="en-US"/>
+            <a:r>
+              <a:rPr lang="en-US" dirty="0" smtClean="0"/>
+              <a:t>5 slides</a:t>
+            </a:r>
+            <a:endParaRPr lang="en-US" dirty="0"/>
           </a:p>
         </p:txBody>
       </p:sp>
@@ -4875,7 +4944,6 @@
               <a:rPr lang="en-US" dirty="0"/>
               <a:t>Computing Inspired by Nature </a:t>
             </a:r>
-            <a:endParaRPr lang="en-US" dirty="0"/>
           </a:p>
           <a:p>
             <a:r>
@@ -5207,6 +5275,25 @@
               <a:rPr lang="en-US" dirty="0" err="1" smtClean="0"/>
               <a:t>physarum</a:t>
             </a:r>
+            <a:endParaRPr lang="en-US" dirty="0" smtClean="0"/>
+          </a:p>
+          <a:p>
+            <a:r>
+              <a:rPr lang="en-US" dirty="0" smtClean="0"/>
+              <a:t>Caveat: What about the distributed nature of P</a:t>
+            </a:r>
+          </a:p>
+          <a:p>
+            <a:r>
+              <a:rPr lang="en-US" dirty="0" smtClean="0"/>
+              <a:t>A model would be nice</a:t>
+            </a:r>
+          </a:p>
+          <a:p>
+            <a:r>
+              <a:rPr lang="en-US" dirty="0" smtClean="0"/>
+              <a:t>Need to learn more about networks to tackle this question</a:t>
+            </a:r>
             <a:endParaRPr lang="en-US" dirty="0"/>
           </a:p>
         </p:txBody>
@@ -5254,13 +5341,17 @@
         <p:spPr/>
         <p:txBody>
           <a:bodyPr>
-            <a:normAutofit/>
+            <a:normAutofit fontScale="90000"/>
           </a:bodyPr>
           <a:lstStyle/>
           <a:p>
             <a:r>
               <a:rPr lang="en-US" dirty="0" smtClean="0"/>
-              <a:t>What about the distributed nature</a:t>
+              <a:t>Our own </a:t>
+            </a:r>
+            <a:r>
+              <a:rPr lang="en-US" dirty="0" smtClean="0"/>
+              <a:t>approach to Natural Computing</a:t>
             </a:r>
             <a:endParaRPr lang="en-US" dirty="0"/>
           </a:p>
@@ -5283,19 +5374,42 @@
           <a:p>
             <a:r>
               <a:rPr lang="en-US" dirty="0" smtClean="0"/>
-              <a:t>Understanding and harvesting this is a nice goal</a:t>
-            </a:r>
-          </a:p>
-          <a:p>
-            <a:r>
-              <a:rPr lang="en-US" dirty="0" smtClean="0"/>
-              <a:t>Need to learn more about the networks</a:t>
-            </a:r>
-          </a:p>
-          <a:p>
-            <a:r>
-              <a:rPr lang="en-US" dirty="0" smtClean="0"/>
-              <a:t>Approach: Model network flows</a:t>
+              <a:t>Experiment </a:t>
+            </a:r>
+            <a:r>
+              <a:rPr lang="en-US" dirty="0" smtClean="0"/>
+              <a:t>design</a:t>
+            </a:r>
+            <a:endParaRPr lang="en-US" dirty="0" smtClean="0"/>
+          </a:p>
+          <a:p>
+            <a:r>
+              <a:rPr lang="en-US" dirty="0" smtClean="0"/>
+              <a:t>Network extraction</a:t>
+            </a:r>
+          </a:p>
+          <a:p>
+            <a:r>
+              <a:rPr lang="en-US" dirty="0" smtClean="0"/>
+              <a:t>Network </a:t>
+            </a:r>
+            <a:r>
+              <a:rPr lang="en-US" dirty="0" smtClean="0"/>
+              <a:t>analysis</a:t>
+            </a:r>
+          </a:p>
+          <a:p>
+            <a:r>
+              <a:rPr lang="en-US" dirty="0" smtClean="0"/>
+              <a:t>Network </a:t>
+            </a:r>
+            <a:r>
+              <a:rPr lang="en-US" dirty="0" err="1"/>
+              <a:t>m</a:t>
+            </a:r>
+            <a:r>
+              <a:rPr lang="en-US" dirty="0" err="1" smtClean="0"/>
+              <a:t>odelling</a:t>
             </a:r>
             <a:endParaRPr lang="en-US" dirty="0"/>
           </a:p>
@@ -5371,7 +5485,11 @@
           <a:bodyPr/>
           <a:lstStyle/>
           <a:p>
-            <a:endParaRPr lang="en-US"/>
+            <a:r>
+              <a:rPr lang="en-US" dirty="0" smtClean="0"/>
+              <a:t>4 slides</a:t>
+            </a:r>
+            <a:endParaRPr lang="en-US" dirty="0"/>
           </a:p>
         </p:txBody>
       </p:sp>

</xml_diff>

<commit_message>
Finished rough first outline.
</commit_message>
<xml_diff>
--- a/draft.pptx
+++ b/draft.pptx
@@ -22,10 +22,13 @@
     <p:sldId id="266" r:id="rId16"/>
     <p:sldId id="267" r:id="rId17"/>
     <p:sldId id="268" r:id="rId18"/>
-    <p:sldId id="269" r:id="rId19"/>
-    <p:sldId id="270" r:id="rId20"/>
-    <p:sldId id="271" r:id="rId21"/>
-    <p:sldId id="273" r:id="rId22"/>
+    <p:sldId id="278" r:id="rId19"/>
+    <p:sldId id="279" r:id="rId20"/>
+    <p:sldId id="269" r:id="rId21"/>
+    <p:sldId id="270" r:id="rId22"/>
+    <p:sldId id="280" r:id="rId23"/>
+    <p:sldId id="271" r:id="rId24"/>
+    <p:sldId id="273" r:id="rId25"/>
   </p:sldIdLst>
   <p:sldSz cx="9144000" cy="6858000" type="screen4x3"/>
   <p:notesSz cx="6858000" cy="9144000"/>
@@ -3951,7 +3954,11 @@
           <a:p>
             <a:r>
               <a:rPr lang="en-US" dirty="0" smtClean="0"/>
-              <a:t>Should be 6</a:t>
+              <a:t>Should be 6 </a:t>
+            </a:r>
+            <a:r>
+              <a:rPr lang="en-US" smtClean="0"/>
+              <a:t>but is 8</a:t>
             </a:r>
             <a:endParaRPr lang="en-US" dirty="0"/>
           </a:p>
@@ -4027,53 +4034,6 @@
           <a:p>
             <a:r>
               <a:rPr lang="en-US" dirty="0" smtClean="0"/>
-              <a:t>No central control</a:t>
-            </a:r>
-          </a:p>
-          <a:p>
-            <a:r>
-              <a:rPr lang="en-US" dirty="0" smtClean="0"/>
-              <a:t>Robust against disturbance</a:t>
-            </a:r>
-          </a:p>
-          <a:p>
-            <a:r>
-              <a:rPr lang="en-US" dirty="0" smtClean="0"/>
-              <a:t>Key points from thesis</a:t>
-            </a:r>
-          </a:p>
-          <a:p>
-            <a:r>
-              <a:rPr lang="en-US" dirty="0" smtClean="0"/>
-              <a:t>Look all these points are </a:t>
-            </a:r>
-            <a:r>
-              <a:rPr lang="en-US" dirty="0" err="1" smtClean="0"/>
-              <a:t>desireable</a:t>
-            </a:r>
-            <a:r>
-              <a:rPr lang="en-US" dirty="0" smtClean="0"/>
-              <a:t> for a distributed </a:t>
-            </a:r>
-            <a:r>
-              <a:rPr lang="en-US" dirty="0" smtClean="0"/>
-              <a:t>algorithm</a:t>
-            </a:r>
-            <a:endParaRPr lang="en-US" dirty="0" smtClean="0"/>
-          </a:p>
-          <a:p>
-            <a:r>
-              <a:rPr lang="en-US" dirty="0" smtClean="0"/>
-              <a:t>A model is required to capture </a:t>
-            </a:r>
-            <a:r>
-              <a:rPr lang="en-US" dirty="0" smtClean="0"/>
-              <a:t>those</a:t>
-            </a:r>
-          </a:p>
-          <a:p>
-            <a:r>
-              <a:rPr lang="en-US" dirty="0" smtClean="0"/>
               <a:t>The organism maintains a dynamic circulation of flow</a:t>
             </a:r>
           </a:p>
@@ -4092,11 +4052,7 @@
           <a:p>
             <a:r>
               <a:rPr lang="en-US" dirty="0" smtClean="0"/>
-              <a:t>The organism has a degree </a:t>
-            </a:r>
-            <a:r>
-              <a:rPr lang="en-US" smtClean="0"/>
-              <a:t>of efficiency</a:t>
+              <a:t>The organism has a degree of efficiency</a:t>
             </a:r>
             <a:endParaRPr lang="en-US" dirty="0"/>
           </a:p>
@@ -4237,6 +4193,36 @@
           </a:p>
         </p:txBody>
       </p:sp>
+      <p:pic>
+        <p:nvPicPr>
+          <p:cNvPr id="4" name="Picture 3" descr="plasmodium_hand_drawing.png"/>
+          <p:cNvPicPr>
+            <a:picLocks noChangeAspect="1"/>
+          </p:cNvPicPr>
+          <p:nvPr/>
+        </p:nvPicPr>
+        <p:blipFill>
+          <a:blip r:embed="rId2">
+            <a:extLst>
+              <a:ext uri="{28A0092B-C50C-407E-A947-70E740481C1C}">
+                <a14:useLocalDpi xmlns:a14="http://schemas.microsoft.com/office/drawing/2010/main" val="0"/>
+              </a:ext>
+            </a:extLst>
+          </a:blip>
+          <a:stretch>
+            <a:fillRect/>
+          </a:stretch>
+        </p:blipFill>
+        <p:spPr>
+          <a:xfrm>
+            <a:off x="3553270" y="4139290"/>
+            <a:ext cx="4006879" cy="2337710"/>
+          </a:xfrm>
+          <a:prstGeom prst="rect">
+            <a:avLst/>
+          </a:prstGeom>
+        </p:spPr>
+      </p:pic>
     </p:spTree>
     <p:extLst>
       <p:ext uri="{BB962C8B-B14F-4D97-AF65-F5344CB8AC3E}">
@@ -4279,16 +4265,18 @@
         </p:nvSpPr>
         <p:spPr/>
         <p:txBody>
-          <a:bodyPr/>
+          <a:bodyPr>
+            <a:normAutofit fontScale="90000"/>
+          </a:bodyPr>
           <a:lstStyle/>
           <a:p>
             <a:r>
               <a:rPr lang="en-US" dirty="0" err="1" smtClean="0"/>
-              <a:t>Physarum</a:t>
-            </a:r>
-            <a:r>
-              <a:rPr lang="en-US" dirty="0" smtClean="0"/>
-              <a:t> elements</a:t>
+              <a:t>Modelling</a:t>
+            </a:r>
+            <a:r>
+              <a:rPr lang="en-US" dirty="0" smtClean="0"/>
+              <a:t> a vein segment – P elements</a:t>
             </a:r>
             <a:endParaRPr lang="en-US" dirty="0"/>
           </a:p>
@@ -4311,18 +4299,71 @@
           <a:p>
             <a:r>
               <a:rPr lang="en-US" dirty="0" smtClean="0"/>
-              <a:t>Description</a:t>
-            </a:r>
-          </a:p>
-          <a:p>
-            <a:r>
-              <a:rPr lang="en-US" dirty="0" smtClean="0"/>
-              <a:t>Put them on graphs</a:t>
-            </a:r>
-            <a:endParaRPr lang="en-US" dirty="0"/>
-          </a:p>
-        </p:txBody>
-      </p:sp>
+              <a:t>Description: Resistances, Capacitance, Current controlled voltage source</a:t>
+            </a:r>
+            <a:endParaRPr lang="en-US" dirty="0" smtClean="0"/>
+          </a:p>
+          <a:p>
+            <a:r>
+              <a:rPr lang="en-US" dirty="0" smtClean="0"/>
+              <a:t>How strong can </a:t>
+            </a:r>
+            <a:r>
+              <a:rPr lang="en-US" dirty="0" err="1" smtClean="0"/>
+              <a:t>u_p</a:t>
+            </a:r>
+            <a:r>
+              <a:rPr lang="en-US" dirty="0" smtClean="0"/>
+              <a:t> react?</a:t>
+            </a:r>
+          </a:p>
+          <a:p>
+            <a:r>
+              <a:rPr lang="en-US" dirty="0" smtClean="0"/>
+              <a:t>How fast can </a:t>
+            </a:r>
+            <a:r>
+              <a:rPr lang="en-US" dirty="0" err="1" smtClean="0"/>
+              <a:t>u_p</a:t>
+            </a:r>
+            <a:r>
+              <a:rPr lang="en-US" dirty="0" smtClean="0"/>
+              <a:t> react?</a:t>
+            </a:r>
+            <a:endParaRPr lang="en-US" dirty="0"/>
+          </a:p>
+        </p:txBody>
+      </p:sp>
+      <p:pic>
+        <p:nvPicPr>
+          <p:cNvPr id="5" name="Picture 4" descr="p_element.png"/>
+          <p:cNvPicPr>
+            <a:picLocks noChangeAspect="1"/>
+          </p:cNvPicPr>
+          <p:nvPr/>
+        </p:nvPicPr>
+        <p:blipFill>
+          <a:blip r:embed="rId2">
+            <a:extLst>
+              <a:ext uri="{28A0092B-C50C-407E-A947-70E740481C1C}">
+                <a14:useLocalDpi xmlns:a14="http://schemas.microsoft.com/office/drawing/2010/main" val="0"/>
+              </a:ext>
+            </a:extLst>
+          </a:blip>
+          <a:stretch>
+            <a:fillRect/>
+          </a:stretch>
+        </p:blipFill>
+        <p:spPr>
+          <a:xfrm>
+            <a:off x="2136728" y="3930736"/>
+            <a:ext cx="4304893" cy="1467577"/>
+          </a:xfrm>
+          <a:prstGeom prst="rect">
+            <a:avLst/>
+          </a:prstGeom>
+        </p:spPr>
+      </p:pic>
     </p:spTree>
     <p:extLst>
       <p:ext uri="{BB962C8B-B14F-4D97-AF65-F5344CB8AC3E}">
@@ -4370,39 +4411,50 @@
           <a:p>
             <a:r>
               <a:rPr lang="en-US" dirty="0" smtClean="0"/>
-              <a:t>Example a cycle</a:t>
-            </a:r>
-            <a:endParaRPr lang="en-US" dirty="0"/>
-          </a:p>
-        </p:txBody>
-      </p:sp>
-      <p:sp>
-        <p:nvSpPr>
-          <p:cNvPr id="3" name="Content Placeholder 2"/>
-          <p:cNvSpPr>
-            <a:spLocks noGrp="1"/>
-          </p:cNvSpPr>
+              <a:t>Details of P </a:t>
+            </a:r>
+            <a:r>
+              <a:rPr lang="en-US" dirty="0" err="1" smtClean="0"/>
+              <a:t>elemets</a:t>
+            </a:r>
+            <a:endParaRPr lang="en-US" dirty="0"/>
+          </a:p>
+        </p:txBody>
+      </p:sp>
+      <p:pic>
+        <p:nvPicPr>
+          <p:cNvPr id="4" name="Content Placeholder 3" descr="Screen Shot 2017-07-10 at 4.10.05 PM.png"/>
+          <p:cNvPicPr>
+            <a:picLocks noGrp="1" noChangeAspect="1"/>
+          </p:cNvPicPr>
           <p:nvPr>
             <p:ph idx="1"/>
           </p:nvPr>
-        </p:nvSpPr>
-        <p:spPr/>
-        <p:txBody>
-          <a:bodyPr/>
-          <a:lstStyle/>
-          <a:p>
-            <a:r>
-              <a:rPr lang="en-US" dirty="0" smtClean="0"/>
-              <a:t>Theoretical description and simulation results agree</a:t>
-            </a:r>
-            <a:endParaRPr lang="en-US" dirty="0"/>
-          </a:p>
-        </p:txBody>
-      </p:sp>
+        </p:nvPicPr>
+        <p:blipFill>
+          <a:blip r:embed="rId2">
+            <a:extLst>
+              <a:ext uri="{28A0092B-C50C-407E-A947-70E740481C1C}">
+                <a14:useLocalDpi xmlns:a14="http://schemas.microsoft.com/office/drawing/2010/main" val="0"/>
+              </a:ext>
+            </a:extLst>
+          </a:blip>
+          <a:srcRect l="11648" r="11648"/>
+          <a:stretch>
+            <a:fillRect/>
+          </a:stretch>
+        </p:blipFill>
+        <p:spPr>
+          <a:xfrm>
+            <a:off x="1753955" y="1872328"/>
+            <a:ext cx="5435936" cy="3149614"/>
+          </a:xfrm>
+        </p:spPr>
+      </p:pic>
     </p:spTree>
     <p:extLst>
       <p:ext uri="{BB962C8B-B14F-4D97-AF65-F5344CB8AC3E}">
-        <p14:creationId xmlns:p14="http://schemas.microsoft.com/office/powerpoint/2010/main" val="2030110140"/>
+        <p14:creationId xmlns:p14="http://schemas.microsoft.com/office/powerpoint/2010/main" val="2677269913"/>
       </p:ext>
     </p:extLst>
   </p:cSld>
@@ -4445,8 +4497,12 @@
           <a:lstStyle/>
           <a:p>
             <a:r>
-              <a:rPr lang="en-US" dirty="0" smtClean="0"/>
-              <a:t>Two linked cycles</a:t>
+              <a:rPr lang="en-US" dirty="0" err="1" smtClean="0"/>
+              <a:t>Physarum</a:t>
+            </a:r>
+            <a:r>
+              <a:rPr lang="en-US" dirty="0" smtClean="0"/>
+              <a:t> networks</a:t>
             </a:r>
             <a:endParaRPr lang="en-US" dirty="0"/>
           </a:p>
@@ -4469,20 +4525,43 @@
           <a:p>
             <a:r>
               <a:rPr lang="en-US" dirty="0" smtClean="0"/>
-              <a:t>More action </a:t>
-            </a:r>
-            <a:r>
-              <a:rPr lang="en-US" smtClean="0"/>
-              <a:t>and oscillations</a:t>
-            </a:r>
-            <a:endParaRPr lang="en-US"/>
+              <a:t>Slap elements onto the graph</a:t>
+            </a:r>
+          </a:p>
+          <a:p>
+            <a:r>
+              <a:rPr lang="en-US" dirty="0" smtClean="0"/>
+              <a:t>Solve the electrical system</a:t>
+            </a:r>
+          </a:p>
+          <a:p>
+            <a:r>
+              <a:rPr lang="en-US" dirty="0" smtClean="0"/>
+              <a:t>Observe the convergence of the capacitor voltages and the resulting currents</a:t>
+            </a:r>
+          </a:p>
+          <a:p>
+            <a:endParaRPr lang="en-US" dirty="0"/>
+          </a:p>
+          <a:p>
+            <a:r>
+              <a:rPr lang="en-US" dirty="0" smtClean="0"/>
+              <a:t>Model can be discretized and solved numerically</a:t>
+            </a:r>
+          </a:p>
+          <a:p>
+            <a:r>
+              <a:rPr lang="en-US" dirty="0" smtClean="0"/>
+              <a:t>Several analytical results available</a:t>
+            </a:r>
+            <a:endParaRPr lang="en-US" dirty="0"/>
           </a:p>
         </p:txBody>
       </p:sp>
     </p:spTree>
     <p:extLst>
       <p:ext uri="{BB962C8B-B14F-4D97-AF65-F5344CB8AC3E}">
-        <p14:creationId xmlns:p14="http://schemas.microsoft.com/office/powerpoint/2010/main" val="2030110140"/>
+        <p14:creationId xmlns:p14="http://schemas.microsoft.com/office/powerpoint/2010/main" val="2829446597"/>
       </p:ext>
     </p:extLst>
   </p:cSld>
@@ -4633,7 +4712,7 @@
           <a:p>
             <a:r>
               <a:rPr lang="en-US" dirty="0" smtClean="0"/>
-              <a:t>summary</a:t>
+              <a:t>Example a cycle</a:t>
             </a:r>
             <a:endParaRPr lang="en-US" dirty="0"/>
           </a:p>
@@ -4654,7 +4733,11 @@
           <a:bodyPr/>
           <a:lstStyle/>
           <a:p>
-            <a:endParaRPr lang="en-US"/>
+            <a:r>
+              <a:rPr lang="en-US" dirty="0" smtClean="0"/>
+              <a:t>Theoretical description and simulation results agree</a:t>
+            </a:r>
+            <a:endParaRPr lang="en-US" dirty="0"/>
           </a:p>
         </p:txBody>
       </p:sp>
@@ -4672,6 +4755,230 @@
 </file>
 
 <file path=ppt/slides/slide21.xml><?xml version="1.0" encoding="utf-8"?>
+<p:sld xmlns:a="http://schemas.openxmlformats.org/drawingml/2006/main" xmlns:r="http://schemas.openxmlformats.org/officeDocument/2006/relationships" xmlns:p="http://schemas.openxmlformats.org/presentationml/2006/main">
+  <p:cSld>
+    <p:spTree>
+      <p:nvGrpSpPr>
+        <p:cNvPr id="1" name=""/>
+        <p:cNvGrpSpPr/>
+        <p:nvPr/>
+      </p:nvGrpSpPr>
+      <p:grpSpPr>
+        <a:xfrm>
+          <a:off x="0" y="0"/>
+          <a:ext cx="0" cy="0"/>
+          <a:chOff x="0" y="0"/>
+          <a:chExt cx="0" cy="0"/>
+        </a:xfrm>
+      </p:grpSpPr>
+      <p:sp>
+        <p:nvSpPr>
+          <p:cNvPr id="2" name="Title 1"/>
+          <p:cNvSpPr>
+            <a:spLocks noGrp="1"/>
+          </p:cNvSpPr>
+          <p:nvPr>
+            <p:ph type="title"/>
+          </p:nvPr>
+        </p:nvSpPr>
+        <p:spPr/>
+        <p:txBody>
+          <a:bodyPr/>
+          <a:lstStyle/>
+          <a:p>
+            <a:r>
+              <a:rPr lang="en-US" dirty="0" smtClean="0"/>
+              <a:t>Two linked cycles</a:t>
+            </a:r>
+            <a:endParaRPr lang="en-US" dirty="0"/>
+          </a:p>
+        </p:txBody>
+      </p:sp>
+      <p:sp>
+        <p:nvSpPr>
+          <p:cNvPr id="3" name="Content Placeholder 2"/>
+          <p:cNvSpPr>
+            <a:spLocks noGrp="1"/>
+          </p:cNvSpPr>
+          <p:nvPr>
+            <p:ph idx="1"/>
+          </p:nvPr>
+        </p:nvSpPr>
+        <p:spPr/>
+        <p:txBody>
+          <a:bodyPr/>
+          <a:lstStyle/>
+          <a:p>
+            <a:r>
+              <a:rPr lang="en-US" dirty="0" smtClean="0"/>
+              <a:t>More action </a:t>
+            </a:r>
+            <a:r>
+              <a:rPr lang="en-US" smtClean="0"/>
+              <a:t>and oscillations</a:t>
+            </a:r>
+            <a:endParaRPr lang="en-US"/>
+          </a:p>
+        </p:txBody>
+      </p:sp>
+    </p:spTree>
+    <p:extLst>
+      <p:ext uri="{BB962C8B-B14F-4D97-AF65-F5344CB8AC3E}">
+        <p14:creationId xmlns:p14="http://schemas.microsoft.com/office/powerpoint/2010/main" val="2030110140"/>
+      </p:ext>
+    </p:extLst>
+  </p:cSld>
+  <p:clrMapOvr>
+    <a:masterClrMapping/>
+  </p:clrMapOvr>
+</p:sld>
+</file>
+
+<file path=ppt/slides/slide22.xml><?xml version="1.0" encoding="utf-8"?>
+<p:sld xmlns:a="http://schemas.openxmlformats.org/drawingml/2006/main" xmlns:r="http://schemas.openxmlformats.org/officeDocument/2006/relationships" xmlns:p="http://schemas.openxmlformats.org/presentationml/2006/main">
+  <p:cSld>
+    <p:spTree>
+      <p:nvGrpSpPr>
+        <p:cNvPr id="1" name=""/>
+        <p:cNvGrpSpPr/>
+        <p:nvPr/>
+      </p:nvGrpSpPr>
+      <p:grpSpPr>
+        <a:xfrm>
+          <a:off x="0" y="0"/>
+          <a:ext cx="0" cy="0"/>
+          <a:chOff x="0" y="0"/>
+          <a:chExt cx="0" cy="0"/>
+        </a:xfrm>
+      </p:grpSpPr>
+      <p:sp>
+        <p:nvSpPr>
+          <p:cNvPr id="2" name="Title 1"/>
+          <p:cNvSpPr>
+            <a:spLocks noGrp="1"/>
+          </p:cNvSpPr>
+          <p:nvPr>
+            <p:ph type="title"/>
+          </p:nvPr>
+        </p:nvSpPr>
+        <p:spPr/>
+        <p:txBody>
+          <a:bodyPr/>
+          <a:lstStyle/>
+          <a:p>
+            <a:r>
+              <a:rPr lang="en-US" dirty="0" smtClean="0"/>
+              <a:t>Caveats of the model</a:t>
+            </a:r>
+            <a:endParaRPr lang="en-US" dirty="0"/>
+          </a:p>
+        </p:txBody>
+      </p:sp>
+      <p:sp>
+        <p:nvSpPr>
+          <p:cNvPr id="3" name="Content Placeholder 2"/>
+          <p:cNvSpPr>
+            <a:spLocks noGrp="1"/>
+          </p:cNvSpPr>
+          <p:nvPr>
+            <p:ph idx="1"/>
+          </p:nvPr>
+        </p:nvSpPr>
+        <p:spPr/>
+        <p:txBody>
+          <a:bodyPr/>
+          <a:lstStyle/>
+          <a:p>
+            <a:endParaRPr lang="en-US"/>
+          </a:p>
+        </p:txBody>
+      </p:sp>
+    </p:spTree>
+    <p:extLst>
+      <p:ext uri="{BB962C8B-B14F-4D97-AF65-F5344CB8AC3E}">
+        <p14:creationId xmlns:p14="http://schemas.microsoft.com/office/powerpoint/2010/main" val="3041814681"/>
+      </p:ext>
+    </p:extLst>
+  </p:cSld>
+  <p:clrMapOvr>
+    <a:masterClrMapping/>
+  </p:clrMapOvr>
+</p:sld>
+</file>
+
+<file path=ppt/slides/slide23.xml><?xml version="1.0" encoding="utf-8"?>
+<p:sld xmlns:a="http://schemas.openxmlformats.org/drawingml/2006/main" xmlns:r="http://schemas.openxmlformats.org/officeDocument/2006/relationships" xmlns:p="http://schemas.openxmlformats.org/presentationml/2006/main">
+  <p:cSld>
+    <p:spTree>
+      <p:nvGrpSpPr>
+        <p:cNvPr id="1" name=""/>
+        <p:cNvGrpSpPr/>
+        <p:nvPr/>
+      </p:nvGrpSpPr>
+      <p:grpSpPr>
+        <a:xfrm>
+          <a:off x="0" y="0"/>
+          <a:ext cx="0" cy="0"/>
+          <a:chOff x="0" y="0"/>
+          <a:chExt cx="0" cy="0"/>
+        </a:xfrm>
+      </p:grpSpPr>
+      <p:sp>
+        <p:nvSpPr>
+          <p:cNvPr id="2" name="Title 1"/>
+          <p:cNvSpPr>
+            <a:spLocks noGrp="1"/>
+          </p:cNvSpPr>
+          <p:nvPr>
+            <p:ph type="title"/>
+          </p:nvPr>
+        </p:nvSpPr>
+        <p:spPr/>
+        <p:txBody>
+          <a:bodyPr/>
+          <a:lstStyle/>
+          <a:p>
+            <a:r>
+              <a:rPr lang="en-US" dirty="0" smtClean="0"/>
+              <a:t>summary</a:t>
+            </a:r>
+            <a:endParaRPr lang="en-US" dirty="0"/>
+          </a:p>
+        </p:txBody>
+      </p:sp>
+      <p:sp>
+        <p:nvSpPr>
+          <p:cNvPr id="3" name="Content Placeholder 2"/>
+          <p:cNvSpPr>
+            <a:spLocks noGrp="1"/>
+          </p:cNvSpPr>
+          <p:nvPr>
+            <p:ph idx="1"/>
+          </p:nvPr>
+        </p:nvSpPr>
+        <p:spPr/>
+        <p:txBody>
+          <a:bodyPr/>
+          <a:lstStyle/>
+          <a:p>
+            <a:endParaRPr lang="en-US"/>
+          </a:p>
+        </p:txBody>
+      </p:sp>
+    </p:spTree>
+    <p:extLst>
+      <p:ext uri="{BB962C8B-B14F-4D97-AF65-F5344CB8AC3E}">
+        <p14:creationId xmlns:p14="http://schemas.microsoft.com/office/powerpoint/2010/main" val="2030110140"/>
+      </p:ext>
+    </p:extLst>
+  </p:cSld>
+  <p:clrMapOvr>
+    <a:masterClrMapping/>
+  </p:clrMapOvr>
+</p:sld>
+</file>
+
+<file path=ppt/slides/slide24.xml><?xml version="1.0" encoding="utf-8"?>
 <p:sld xmlns:a="http://schemas.openxmlformats.org/drawingml/2006/main" xmlns:r="http://schemas.openxmlformats.org/officeDocument/2006/relationships" xmlns:p="http://schemas.openxmlformats.org/presentationml/2006/main">
   <p:cSld>
     <p:spTree>

</xml_diff>

<commit_message>
Worked on second part of presentation.
</commit_message>
<xml_diff>
--- a/draft.pptx
+++ b/draft.pptx
@@ -319,7 +319,7 @@
           <a:p>
             <a:fld id="{C8A432C8-69A7-458B-9684-2BFA64B31948}" type="datetime2">
               <a:rPr lang="en-US" smtClean="0"/>
-              <a:t>Tuesday, July 11, 17</a:t>
+              <a:t>Friday, July 14, 17</a:t>
             </a:fld>
             <a:endParaRPr lang="en-US"/>
           </a:p>
@@ -521,7 +521,7 @@
           <a:p>
             <a:fld id="{8CC057FC-95B6-4D89-AFDA-ABA33EE921E5}" type="datetime2">
               <a:rPr lang="en-US" smtClean="0"/>
-              <a:t>Tuesday, July 11, 17</a:t>
+              <a:t>Friday, July 14, 17</a:t>
             </a:fld>
             <a:endParaRPr lang="en-US"/>
           </a:p>
@@ -698,7 +698,7 @@
           <a:p>
             <a:fld id="{EC4549AC-EB31-477F-92A9-B1988E232878}" type="datetime2">
               <a:rPr lang="en-US" smtClean="0"/>
-              <a:t>Tuesday, July 11, 17</a:t>
+              <a:t>Friday, July 14, 17</a:t>
             </a:fld>
             <a:endParaRPr lang="en-US"/>
           </a:p>
@@ -865,7 +865,7 @@
           <a:p>
             <a:fld id="{6396A3A3-94A6-4E5B-AF39-173ACA3E61CC}" type="datetime2">
               <a:rPr lang="en-US" smtClean="0"/>
-              <a:t>Tuesday, July 11, 17</a:t>
+              <a:t>Friday, July 14, 17</a:t>
             </a:fld>
             <a:endParaRPr lang="en-US"/>
           </a:p>
@@ -1115,7 +1115,7 @@
           <a:p>
             <a:fld id="{9933D019-A32C-4EAD-B8E6-DBDA699692FD}" type="datetime2">
               <a:rPr lang="en-US" smtClean="0"/>
-              <a:t>Tuesday, July 11, 17</a:t>
+              <a:t>Friday, July 14, 17</a:t>
             </a:fld>
             <a:endParaRPr lang="en-US"/>
           </a:p>
@@ -1435,7 +1435,7 @@
           <a:p>
             <a:fld id="{CCEBA98F-560C-4997-81C4-81D4D9187EAB}" type="datetime2">
               <a:rPr lang="en-US" smtClean="0"/>
-              <a:t>Tuesday, July 11, 17</a:t>
+              <a:t>Friday, July 14, 17</a:t>
             </a:fld>
             <a:endParaRPr lang="en-US"/>
           </a:p>
@@ -1903,7 +1903,7 @@
           <a:p>
             <a:fld id="{150972B2-CA5C-437D-87D0-8081271A9E4B}" type="datetime2">
               <a:rPr lang="en-US" smtClean="0"/>
-              <a:t>Tuesday, July 11, 17</a:t>
+              <a:t>Friday, July 14, 17</a:t>
             </a:fld>
             <a:endParaRPr lang="en-US"/>
           </a:p>
@@ -2053,7 +2053,7 @@
           <a:p>
             <a:fld id="{79CD4847-11EF-4466-A8AD-85CDB7B49118}" type="datetime2">
               <a:rPr lang="en-US" smtClean="0"/>
-              <a:t>Tuesday, July 11, 17</a:t>
+              <a:t>Friday, July 14, 17</a:t>
             </a:fld>
             <a:endParaRPr lang="en-US"/>
           </a:p>
@@ -2145,7 +2145,7 @@
           <a:p>
             <a:fld id="{F168457A-3AB9-4880-8A0C-9F8524491207}" type="datetime2">
               <a:rPr lang="en-US" smtClean="0"/>
-              <a:t>Tuesday, July 11, 17</a:t>
+              <a:t>Friday, July 14, 17</a:t>
             </a:fld>
             <a:endParaRPr lang="en-US"/>
           </a:p>
@@ -2421,7 +2421,7 @@
           <a:p>
             <a:fld id="{3FE976D3-5B7F-4300-ABED-C91F1B2AE209}" type="datetime2">
               <a:rPr lang="en-US" smtClean="0"/>
-              <a:t>Tuesday, July 11, 17</a:t>
+              <a:t>Friday, July 14, 17</a:t>
             </a:fld>
             <a:endParaRPr lang="en-US"/>
           </a:p>
@@ -2728,7 +2728,7 @@
           <a:p>
             <a:fld id="{EBDC1E59-17DD-41CE-97CA-624A472382D4}" type="datetime2">
               <a:rPr lang="en-US" smtClean="0"/>
-              <a:t>Tuesday, July 11, 17</a:t>
+              <a:t>Friday, July 14, 17</a:t>
             </a:fld>
             <a:endParaRPr lang="en-US"/>
           </a:p>
@@ -3028,7 +3028,7 @@
           <a:p>
             <a:fld id="{A80CB818-7379-467D-8E76-EF9D9074A26C}" type="datetime2">
               <a:rPr lang="en-US" smtClean="0"/>
-              <a:t>Tuesday, July 11, 17</a:t>
+              <a:t>Friday, July 14, 17</a:t>
             </a:fld>
             <a:endParaRPr lang="en-US" dirty="0"/>
           </a:p>
@@ -4819,7 +4819,6 @@
               <a:rPr lang="en-US" dirty="0" smtClean="0"/>
               <a:t> we always have convergence</a:t>
             </a:r>
-            <a:endParaRPr lang="en-US" dirty="0" smtClean="0"/>
           </a:p>
           <a:p>
             <a:r>
@@ -4906,11 +4905,7 @@
           <a:p>
             <a:r>
               <a:rPr lang="en-US" dirty="0" smtClean="0"/>
-              <a:t>Biologically relevant as </a:t>
-            </a:r>
-            <a:r>
-              <a:rPr lang="en-US" dirty="0" smtClean="0"/>
-              <a:t>this setup mimics a famous real experiment</a:t>
+              <a:t>Biologically relevant as this setup mimics a famous real experiment</a:t>
             </a:r>
           </a:p>
           <a:p>
@@ -4922,11 +4917,7 @@
           <a:p>
             <a:r>
               <a:rPr lang="en-US" dirty="0" smtClean="0"/>
-              <a:t>Numerical results indicate flow reversals on the </a:t>
-            </a:r>
-            <a:r>
-              <a:rPr lang="en-US" smtClean="0"/>
-              <a:t>link edge</a:t>
+              <a:t>Numerical results indicate flow reversals on the link edge</a:t>
             </a:r>
             <a:endParaRPr lang="en-US" dirty="0"/>
           </a:p>
@@ -4979,11 +4970,7 @@
           <a:p>
             <a:r>
               <a:rPr lang="en-US" dirty="0" smtClean="0"/>
-              <a:t>Discussion and Caveats </a:t>
-            </a:r>
-            <a:r>
-              <a:rPr lang="en-US" dirty="0" smtClean="0"/>
-              <a:t>of the model</a:t>
+              <a:t>Discussion and Caveats of the model</a:t>
             </a:r>
             <a:endParaRPr lang="en-US" dirty="0"/>
           </a:p>
@@ -5823,13 +5810,21 @@
           <a:p>
             <a:r>
               <a:rPr lang="en-US" dirty="0" smtClean="0"/>
-              <a:t>Shortest path algorithms</a:t>
-            </a:r>
-          </a:p>
-          <a:p>
-            <a:r>
-              <a:rPr lang="en-US" dirty="0" smtClean="0"/>
-              <a:t>Many body simulations</a:t>
+              <a:t>Computing inspired by P (shortest path, spanning trees)</a:t>
+            </a:r>
+          </a:p>
+          <a:p>
+            <a:r>
+              <a:rPr lang="en-US" dirty="0" smtClean="0"/>
+              <a:t>Synthesis of P (many body simulations, </a:t>
+            </a:r>
+            <a:r>
+              <a:rPr lang="en-US" dirty="0" err="1" smtClean="0"/>
+              <a:t>Voronoi</a:t>
+            </a:r>
+            <a:r>
+              <a:rPr lang="en-US" dirty="0" smtClean="0"/>
+              <a:t> diagrams, TSP tours)</a:t>
             </a:r>
           </a:p>
           <a:p>
@@ -5841,7 +5836,10 @@
               <a:rPr lang="en-US" dirty="0" err="1" smtClean="0"/>
               <a:t>physarum</a:t>
             </a:r>
-            <a:endParaRPr lang="en-US" dirty="0" smtClean="0"/>
+            <a:r>
+              <a:rPr lang="en-US" dirty="0" smtClean="0"/>
+              <a:t> (transport network design, logic gates &amp; computers)</a:t>
+            </a:r>
           </a:p>
           <a:p>
             <a:r>

</xml_diff>